<commit_message>
Working on other thesis materials, improving some code
</commit_message>
<xml_diff>
--- a/GAM Models/T-S_Plots_predict_plot.pptx
+++ b/GAM Models/T-S_Plots_predict_plot.pptx
@@ -112,6 +112,11 @@
       </a:defRPr>
     </a:lvl9pPr>
   </p:defaultTextStyle>
+  <p:extLst>
+    <p:ext uri="{EFAFB233-063F-42B5-8137-9DF3F51BA10A}">
+      <p15:sldGuideLst xmlns:p15="http://schemas.microsoft.com/office/powerpoint/2012/main"/>
+    </p:ext>
+  </p:extLst>
 </p:presentation>
 </file>
 
@@ -197,7 +202,7 @@
           <a:p>
             <a:fld id="{FB6ACEBA-CD1F-4855-A4CB-3CACF6D8709C}" type="datetimeFigureOut">
               <a:rPr lang="en-US" smtClean="0"/>
-              <a:t>12/23/2021</a:t>
+              <a:t>12/31/2021</a:t>
             </a:fld>
             <a:endParaRPr lang="en-US"/>
           </a:p>
@@ -781,7 +786,7 @@
           <a:p>
             <a:fld id="{CF028C7B-C361-4E76-822A-392294E7F7FF}" type="datetimeFigureOut">
               <a:rPr lang="en-US" smtClean="0"/>
-              <a:t>12/22/2021</a:t>
+              <a:t>12/31/2021</a:t>
             </a:fld>
             <a:endParaRPr lang="en-US"/>
           </a:p>
@@ -989,7 +994,7 @@
           <a:p>
             <a:fld id="{CF028C7B-C361-4E76-822A-392294E7F7FF}" type="datetimeFigureOut">
               <a:rPr lang="en-US" smtClean="0"/>
-              <a:t>12/22/2021</a:t>
+              <a:t>12/31/2021</a:t>
             </a:fld>
             <a:endParaRPr lang="en-US"/>
           </a:p>
@@ -1245,7 +1250,7 @@
           <a:p>
             <a:fld id="{CF028C7B-C361-4E76-822A-392294E7F7FF}" type="datetimeFigureOut">
               <a:rPr lang="en-US" smtClean="0"/>
-              <a:t>12/22/2021</a:t>
+              <a:t>12/31/2021</a:t>
             </a:fld>
             <a:endParaRPr lang="en-US"/>
           </a:p>
@@ -1415,7 +1420,7 @@
           <a:p>
             <a:fld id="{CF028C7B-C361-4E76-822A-392294E7F7FF}" type="datetimeFigureOut">
               <a:rPr lang="en-US" smtClean="0"/>
-              <a:t>12/22/2021</a:t>
+              <a:t>12/31/2021</a:t>
             </a:fld>
             <a:endParaRPr lang="en-US"/>
           </a:p>
@@ -1758,7 +1763,7 @@
           <a:p>
             <a:fld id="{CF028C7B-C361-4E76-822A-392294E7F7FF}" type="datetimeFigureOut">
               <a:rPr lang="en-US" smtClean="0"/>
-              <a:t>12/22/2021</a:t>
+              <a:t>12/31/2021</a:t>
             </a:fld>
             <a:endParaRPr lang="en-US"/>
           </a:p>
@@ -2033,7 +2038,7 @@
           <a:p>
             <a:fld id="{CF028C7B-C361-4E76-822A-392294E7F7FF}" type="datetimeFigureOut">
               <a:rPr lang="en-US" smtClean="0"/>
-              <a:t>12/22/2021</a:t>
+              <a:t>12/31/2021</a:t>
             </a:fld>
             <a:endParaRPr lang="en-US"/>
           </a:p>
@@ -2412,7 +2417,7 @@
           <a:p>
             <a:fld id="{CF028C7B-C361-4E76-822A-392294E7F7FF}" type="datetimeFigureOut">
               <a:rPr lang="en-US" smtClean="0"/>
-              <a:t>12/22/2021</a:t>
+              <a:t>12/31/2021</a:t>
             </a:fld>
             <a:endParaRPr lang="en-US"/>
           </a:p>
@@ -2530,7 +2535,7 @@
           <a:p>
             <a:fld id="{CF028C7B-C361-4E76-822A-392294E7F7FF}" type="datetimeFigureOut">
               <a:rPr lang="en-US" smtClean="0"/>
-              <a:t>12/22/2021</a:t>
+              <a:t>12/31/2021</a:t>
             </a:fld>
             <a:endParaRPr lang="en-US"/>
           </a:p>
@@ -2701,7 +2706,7 @@
           <a:p>
             <a:fld id="{CF028C7B-C361-4E76-822A-392294E7F7FF}" type="datetimeFigureOut">
               <a:rPr lang="en-US" smtClean="0"/>
-              <a:t>12/22/2021</a:t>
+              <a:t>12/31/2021</a:t>
             </a:fld>
             <a:endParaRPr lang="en-US"/>
           </a:p>
@@ -3055,7 +3060,7 @@
           <a:p>
             <a:fld id="{CF028C7B-C361-4E76-822A-392294E7F7FF}" type="datetimeFigureOut">
               <a:rPr lang="en-US" smtClean="0"/>
-              <a:t>12/22/2021</a:t>
+              <a:t>12/31/2021</a:t>
             </a:fld>
             <a:endParaRPr lang="en-US"/>
           </a:p>
@@ -3432,7 +3437,7 @@
           <a:p>
             <a:fld id="{CF028C7B-C361-4E76-822A-392294E7F7FF}" type="datetimeFigureOut">
               <a:rPr lang="en-US" smtClean="0"/>
-              <a:t>12/22/2021</a:t>
+              <a:t>12/31/2021</a:t>
             </a:fld>
             <a:endParaRPr lang="en-US"/>
           </a:p>
@@ -3719,7 +3724,7 @@
           <a:p>
             <a:fld id="{CF028C7B-C361-4E76-822A-392294E7F7FF}" type="datetimeFigureOut">
               <a:rPr lang="en-US" smtClean="0"/>
-              <a:t>12/22/2021</a:t>
+              <a:t>12/31/2021</a:t>
             </a:fld>
             <a:endParaRPr lang="en-US"/>
           </a:p>

</xml_diff>